<commit_message>
Terminada presentación del segundo hito.
</commit_message>
<xml_diff>
--- a/Presentación/Hito 2/Duo Bot_Hito 2.pptx
+++ b/Presentación/Hito 2/Duo Bot_Hito 2.pptx
@@ -7,13 +7,10 @@
   <p:sldIdLst>
     <p:sldId id="256" r:id="rId2"/>
     <p:sldId id="257" r:id="rId3"/>
-    <p:sldId id="258" r:id="rId4"/>
-    <p:sldId id="259" r:id="rId5"/>
-    <p:sldId id="260" r:id="rId6"/>
-    <p:sldId id="261" r:id="rId7"/>
-    <p:sldId id="262" r:id="rId8"/>
-    <p:sldId id="263" r:id="rId9"/>
-    <p:sldId id="264" r:id="rId10"/>
+    <p:sldId id="260" r:id="rId4"/>
+    <p:sldId id="262" r:id="rId5"/>
+    <p:sldId id="263" r:id="rId6"/>
+    <p:sldId id="264" r:id="rId7"/>
   </p:sldIdLst>
   <p:sldSz cx="9144000" cy="6858000" type="screen4x3"/>
   <p:notesSz cx="6858000" cy="9144000"/>
@@ -296,7 +293,7 @@
           <a:p>
             <a:fld id="{3FAFE21F-F6A6-4E6E-89EF-7579FEDCEE9C}" type="datetimeFigureOut">
               <a:rPr lang="es-ES" smtClean="0"/>
-              <a:t>16/11/2019</a:t>
+              <a:t>17/11/2019</a:t>
             </a:fld>
             <a:endParaRPr lang="es-ES"/>
           </a:p>
@@ -466,7 +463,7 @@
           <a:p>
             <a:fld id="{3FAFE21F-F6A6-4E6E-89EF-7579FEDCEE9C}" type="datetimeFigureOut">
               <a:rPr lang="es-ES" smtClean="0"/>
-              <a:t>16/11/2019</a:t>
+              <a:t>17/11/2019</a:t>
             </a:fld>
             <a:endParaRPr lang="es-ES"/>
           </a:p>
@@ -646,7 +643,7 @@
           <a:p>
             <a:fld id="{3FAFE21F-F6A6-4E6E-89EF-7579FEDCEE9C}" type="datetimeFigureOut">
               <a:rPr lang="es-ES" smtClean="0"/>
-              <a:t>16/11/2019</a:t>
+              <a:t>17/11/2019</a:t>
             </a:fld>
             <a:endParaRPr lang="es-ES"/>
           </a:p>
@@ -816,7 +813,7 @@
           <a:p>
             <a:fld id="{3FAFE21F-F6A6-4E6E-89EF-7579FEDCEE9C}" type="datetimeFigureOut">
               <a:rPr lang="es-ES" smtClean="0"/>
-              <a:t>16/11/2019</a:t>
+              <a:t>17/11/2019</a:t>
             </a:fld>
             <a:endParaRPr lang="es-ES"/>
           </a:p>
@@ -1062,7 +1059,7 @@
           <a:p>
             <a:fld id="{3FAFE21F-F6A6-4E6E-89EF-7579FEDCEE9C}" type="datetimeFigureOut">
               <a:rPr lang="es-ES" smtClean="0"/>
-              <a:t>16/11/2019</a:t>
+              <a:t>17/11/2019</a:t>
             </a:fld>
             <a:endParaRPr lang="es-ES"/>
           </a:p>
@@ -1350,7 +1347,7 @@
           <a:p>
             <a:fld id="{3FAFE21F-F6A6-4E6E-89EF-7579FEDCEE9C}" type="datetimeFigureOut">
               <a:rPr lang="es-ES" smtClean="0"/>
-              <a:t>16/11/2019</a:t>
+              <a:t>17/11/2019</a:t>
             </a:fld>
             <a:endParaRPr lang="es-ES"/>
           </a:p>
@@ -1772,7 +1769,7 @@
           <a:p>
             <a:fld id="{3FAFE21F-F6A6-4E6E-89EF-7579FEDCEE9C}" type="datetimeFigureOut">
               <a:rPr lang="es-ES" smtClean="0"/>
-              <a:t>16/11/2019</a:t>
+              <a:t>17/11/2019</a:t>
             </a:fld>
             <a:endParaRPr lang="es-ES"/>
           </a:p>
@@ -1890,7 +1887,7 @@
           <a:p>
             <a:fld id="{3FAFE21F-F6A6-4E6E-89EF-7579FEDCEE9C}" type="datetimeFigureOut">
               <a:rPr lang="es-ES" smtClean="0"/>
-              <a:t>16/11/2019</a:t>
+              <a:t>17/11/2019</a:t>
             </a:fld>
             <a:endParaRPr lang="es-ES"/>
           </a:p>
@@ -1985,7 +1982,7 @@
           <a:p>
             <a:fld id="{3FAFE21F-F6A6-4E6E-89EF-7579FEDCEE9C}" type="datetimeFigureOut">
               <a:rPr lang="es-ES" smtClean="0"/>
-              <a:t>16/11/2019</a:t>
+              <a:t>17/11/2019</a:t>
             </a:fld>
             <a:endParaRPr lang="es-ES"/>
           </a:p>
@@ -2262,7 +2259,7 @@
           <a:p>
             <a:fld id="{3FAFE21F-F6A6-4E6E-89EF-7579FEDCEE9C}" type="datetimeFigureOut">
               <a:rPr lang="es-ES" smtClean="0"/>
-              <a:t>16/11/2019</a:t>
+              <a:t>17/11/2019</a:t>
             </a:fld>
             <a:endParaRPr lang="es-ES"/>
           </a:p>
@@ -2515,7 +2512,7 @@
           <a:p>
             <a:fld id="{3FAFE21F-F6A6-4E6E-89EF-7579FEDCEE9C}" type="datetimeFigureOut">
               <a:rPr lang="es-ES" smtClean="0"/>
-              <a:t>16/11/2019</a:t>
+              <a:t>17/11/2019</a:t>
             </a:fld>
             <a:endParaRPr lang="es-ES"/>
           </a:p>
@@ -2728,7 +2725,7 @@
           <a:p>
             <a:fld id="{3FAFE21F-F6A6-4E6E-89EF-7579FEDCEE9C}" type="datetimeFigureOut">
               <a:rPr lang="es-ES" smtClean="0"/>
-              <a:t>16/11/2019</a:t>
+              <a:t>17/11/2019</a:t>
             </a:fld>
             <a:endParaRPr lang="es-ES"/>
           </a:p>
@@ -3089,6 +3086,20 @@
 <file path=ppt/slides/slide1.xml><?xml version="1.0" encoding="utf-8"?>
 <p:sld xmlns:a="http://schemas.openxmlformats.org/drawingml/2006/main" xmlns:r="http://schemas.openxmlformats.org/officeDocument/2006/relationships" xmlns:p="http://schemas.openxmlformats.org/presentationml/2006/main">
   <p:cSld>
+    <p:bg>
+      <p:bgPr>
+        <a:blipFill dpi="0" rotWithShape="1">
+          <a:blip r:embed="rId2">
+            <a:lum/>
+          </a:blip>
+          <a:srcRect/>
+          <a:stretch>
+            <a:fillRect l="-10000" r="-10000"/>
+          </a:stretch>
+        </a:blipFill>
+        <a:effectLst/>
+      </p:bgPr>
+    </p:bg>
     <p:spTree>
       <p:nvGrpSpPr>
         <p:cNvPr id="1" name=""/>
@@ -3105,24 +3116,31 @@
       </p:grpSpPr>
       <p:sp>
         <p:nvSpPr>
-          <p:cNvPr id="2" name="1 Título"/>
-          <p:cNvSpPr>
-            <a:spLocks noGrp="1"/>
-          </p:cNvSpPr>
-          <p:nvPr>
-            <p:ph type="ctrTitle"/>
-          </p:nvPr>
-        </p:nvSpPr>
-        <p:spPr/>
-        <p:txBody>
-          <a:bodyPr/>
-          <a:lstStyle/>
-          <a:p>
-            <a:r>
-              <a:rPr lang="es-ES" dirty="0" smtClean="0"/>
-              <a:t>2DASH</a:t>
-            </a:r>
-            <a:endParaRPr lang="es-ES" dirty="0"/>
+          <p:cNvPr id="4" name="3 CuadroTexto"/>
+          <p:cNvSpPr txBox="1"/>
+          <p:nvPr/>
+        </p:nvSpPr>
+        <p:spPr>
+          <a:xfrm>
+            <a:off x="6577272" y="6604084"/>
+            <a:ext cx="2566728" cy="253916"/>
+          </a:xfrm>
+          <a:prstGeom prst="rect">
+            <a:avLst/>
+          </a:prstGeom>
+          <a:noFill/>
+        </p:spPr>
+        <p:txBody>
+          <a:bodyPr wrap="none" rtlCol="0">
+            <a:spAutoFit/>
+          </a:bodyPr>
+          <a:lstStyle/>
+          <a:p>
+            <a:r>
+              <a:rPr lang="es-ES" sz="1050" dirty="0" smtClean="0"/>
+              <a:t>No, no estamos asociados con estas marcas</a:t>
+            </a:r>
+            <a:endParaRPr lang="es-ES" sz="1050" dirty="0"/>
           </a:p>
         </p:txBody>
       </p:sp>
@@ -3142,6 +3160,20 @@
 <file path=ppt/slides/slide2.xml><?xml version="1.0" encoding="utf-8"?>
 <p:sld xmlns:a="http://schemas.openxmlformats.org/drawingml/2006/main" xmlns:r="http://schemas.openxmlformats.org/officeDocument/2006/relationships" xmlns:p="http://schemas.openxmlformats.org/presentationml/2006/main">
   <p:cSld>
+    <p:bg>
+      <p:bgPr>
+        <a:blipFill dpi="0" rotWithShape="1">
+          <a:blip r:embed="rId2">
+            <a:lum/>
+          </a:blip>
+          <a:srcRect/>
+          <a:stretch>
+            <a:fillRect l="-17000" r="-17000"/>
+          </a:stretch>
+        </a:blipFill>
+        <a:effectLst/>
+      </p:bgPr>
+    </p:bg>
     <p:spTree>
       <p:nvGrpSpPr>
         <p:cNvPr id="1" name=""/>
@@ -3156,54 +3188,6 @@
           <a:chExt cx="0" cy="0"/>
         </a:xfrm>
       </p:grpSpPr>
-      <p:sp>
-        <p:nvSpPr>
-          <p:cNvPr id="2" name="1 Título"/>
-          <p:cNvSpPr>
-            <a:spLocks noGrp="1"/>
-          </p:cNvSpPr>
-          <p:nvPr>
-            <p:ph type="title"/>
-          </p:nvPr>
-        </p:nvSpPr>
-        <p:spPr/>
-        <p:txBody>
-          <a:bodyPr/>
-          <a:lstStyle/>
-          <a:p>
-            <a:r>
-              <a:rPr lang="es-ES" dirty="0" smtClean="0"/>
-              <a:t>Problemas</a:t>
-            </a:r>
-            <a:endParaRPr lang="es-ES" dirty="0"/>
-          </a:p>
-        </p:txBody>
-      </p:sp>
-      <p:sp>
-        <p:nvSpPr>
-          <p:cNvPr id="3" name="2 Marcador de contenido"/>
-          <p:cNvSpPr>
-            <a:spLocks noGrp="1"/>
-          </p:cNvSpPr>
-          <p:nvPr>
-            <p:ph idx="1"/>
-          </p:nvPr>
-        </p:nvSpPr>
-        <p:spPr/>
-        <p:txBody>
-          <a:bodyPr/>
-          <a:lstStyle/>
-          <a:p>
-            <a:pPr marL="0" indent="0">
-              <a:buNone/>
-            </a:pPr>
-            <a:r>
-              <a:rPr lang="es-ES" dirty="0" smtClean="0"/>
-              <a:t>Hicimos ya el juego, el voluntario estaba ya preparado y se fue a enfrentar al CONSTRUCT-0R.</a:t>
-            </a:r>
-          </a:p>
-        </p:txBody>
-      </p:sp>
     </p:spTree>
     <p:extLst>
       <p:ext uri="{BB962C8B-B14F-4D97-AF65-F5344CB8AC3E}">
@@ -3220,6 +3204,20 @@
 <file path=ppt/slides/slide3.xml><?xml version="1.0" encoding="utf-8"?>
 <p:sld xmlns:a="http://schemas.openxmlformats.org/drawingml/2006/main" xmlns:r="http://schemas.openxmlformats.org/officeDocument/2006/relationships" xmlns:p="http://schemas.openxmlformats.org/presentationml/2006/main">
   <p:cSld>
+    <p:bg>
+      <p:bgPr>
+        <a:blipFill dpi="0" rotWithShape="1">
+          <a:blip r:embed="rId2">
+            <a:lum/>
+          </a:blip>
+          <a:srcRect/>
+          <a:stretch>
+            <a:fillRect l="-17000" r="-17000"/>
+          </a:stretch>
+        </a:blipFill>
+        <a:effectLst/>
+      </p:bgPr>
+    </p:bg>
     <p:spTree>
       <p:nvGrpSpPr>
         <p:cNvPr id="1" name=""/>
@@ -3234,113 +3232,100 @@
           <a:chExt cx="0" cy="0"/>
         </a:xfrm>
       </p:grpSpPr>
-      <p:sp>
-        <p:nvSpPr>
-          <p:cNvPr id="2" name="1 Título"/>
-          <p:cNvSpPr>
-            <a:spLocks noGrp="1"/>
-          </p:cNvSpPr>
-          <p:nvPr>
-            <p:ph type="title"/>
-          </p:nvPr>
-        </p:nvSpPr>
-        <p:spPr/>
-        <p:txBody>
-          <a:bodyPr/>
-          <a:lstStyle/>
-          <a:p>
-            <a:r>
-              <a:rPr lang="es-ES" dirty="0" smtClean="0"/>
-              <a:t>Problemas</a:t>
-            </a:r>
-            <a:endParaRPr lang="es-ES" dirty="0"/>
-          </a:p>
-        </p:txBody>
-      </p:sp>
-      <p:sp>
-        <p:nvSpPr>
-          <p:cNvPr id="3" name="2 Marcador de contenido"/>
-          <p:cNvSpPr>
-            <a:spLocks noGrp="1"/>
-          </p:cNvSpPr>
-          <p:nvPr>
-            <p:ph idx="1"/>
-          </p:nvPr>
-        </p:nvSpPr>
-        <p:spPr/>
-        <p:txBody>
-          <a:bodyPr/>
-          <a:lstStyle/>
-          <a:p>
-            <a:pPr marL="0" indent="0">
-              <a:buNone/>
-            </a:pPr>
-            <a:r>
-              <a:rPr lang="es-ES" dirty="0" smtClean="0"/>
-              <a:t>Tuvo problemas en el combate…</a:t>
-            </a:r>
-          </a:p>
-          <a:p>
-            <a:pPr marL="0" indent="0">
-              <a:buNone/>
-            </a:pPr>
-            <a:r>
-              <a:rPr lang="es-ES" dirty="0" smtClean="0"/>
-              <a:t>-Murió.</a:t>
-            </a:r>
-          </a:p>
-          <a:p>
-            <a:pPr marL="0" indent="0">
-              <a:buNone/>
-            </a:pPr>
-            <a:r>
-              <a:rPr lang="es-ES" dirty="0" smtClean="0"/>
-              <a:t>-Sí, murió.</a:t>
-            </a:r>
-          </a:p>
-          <a:p>
-            <a:pPr marL="0" indent="0">
-              <a:buNone/>
-            </a:pPr>
-            <a:r>
-              <a:rPr lang="es-ES" dirty="0" smtClean="0"/>
-              <a:t>-Fue hecho cachitos.</a:t>
-            </a:r>
-          </a:p>
-          <a:p>
-            <a:pPr marL="0" indent="0">
-              <a:buNone/>
-            </a:pPr>
-            <a:r>
-              <a:rPr lang="es-ES" dirty="0" smtClean="0"/>
-              <a:t>-Sí.</a:t>
-            </a:r>
-          </a:p>
-          <a:p>
-            <a:pPr marL="0" indent="0">
-              <a:buNone/>
-            </a:pPr>
-            <a:r>
-              <a:rPr lang="es-ES" dirty="0" smtClean="0"/>
-              <a:t>-Destrozado.</a:t>
-            </a:r>
-          </a:p>
-          <a:p>
-            <a:pPr marL="0" indent="0">
-              <a:buNone/>
-            </a:pPr>
-            <a:r>
-              <a:rPr lang="es-ES" dirty="0" smtClean="0"/>
-              <a:t>Silencio.</a:t>
-            </a:r>
-            <a:endParaRPr lang="es-ES" dirty="0"/>
-          </a:p>
-        </p:txBody>
-      </p:sp>
+      <p:pic>
+        <p:nvPicPr>
+          <p:cNvPr id="7" name="6 Imagen"/>
+          <p:cNvPicPr>
+            <a:picLocks noChangeAspect="1"/>
+          </p:cNvPicPr>
+          <p:nvPr/>
+        </p:nvPicPr>
+        <p:blipFill>
+          <a:blip r:embed="rId3" cstate="print">
+            <a:extLst>
+              <a:ext uri="{28A0092B-C50C-407E-A947-70E740481C1C}">
+                <a14:useLocalDpi xmlns:a14="http://schemas.microsoft.com/office/drawing/2010/main" val="0"/>
+              </a:ext>
+            </a:extLst>
+          </a:blip>
+          <a:stretch>
+            <a:fillRect/>
+          </a:stretch>
+        </p:blipFill>
+        <p:spPr>
+          <a:xfrm>
+            <a:off x="6300192" y="620688"/>
+            <a:ext cx="1224136" cy="1224136"/>
+          </a:xfrm>
+          <a:prstGeom prst="rect">
+            <a:avLst/>
+          </a:prstGeom>
+        </p:spPr>
+      </p:pic>
+      <p:pic>
+        <p:nvPicPr>
+          <p:cNvPr id="8" name="7 Imagen"/>
+          <p:cNvPicPr>
+            <a:picLocks noChangeAspect="1"/>
+          </p:cNvPicPr>
+          <p:nvPr/>
+        </p:nvPicPr>
+        <p:blipFill>
+          <a:blip r:embed="rId4" cstate="print">
+            <a:extLst>
+              <a:ext uri="{28A0092B-C50C-407E-A947-70E740481C1C}">
+                <a14:useLocalDpi xmlns:a14="http://schemas.microsoft.com/office/drawing/2010/main" val="0"/>
+              </a:ext>
+            </a:extLst>
+          </a:blip>
+          <a:stretch>
+            <a:fillRect/>
+          </a:stretch>
+        </p:blipFill>
+        <p:spPr>
+          <a:xfrm>
+            <a:off x="7092280" y="3212976"/>
+            <a:ext cx="864096" cy="864096"/>
+          </a:xfrm>
+          <a:prstGeom prst="rect">
+            <a:avLst/>
+          </a:prstGeom>
+        </p:spPr>
+      </p:pic>
+      <p:pic>
+        <p:nvPicPr>
+          <p:cNvPr id="9" name="8 Imagen"/>
+          <p:cNvPicPr>
+            <a:picLocks noChangeAspect="1"/>
+          </p:cNvPicPr>
+          <p:nvPr/>
+        </p:nvPicPr>
+        <p:blipFill>
+          <a:blip r:embed="rId4" cstate="print">
+            <a:extLst>
+              <a:ext uri="{28A0092B-C50C-407E-A947-70E740481C1C}">
+                <a14:useLocalDpi xmlns:a14="http://schemas.microsoft.com/office/drawing/2010/main" val="0"/>
+              </a:ext>
+            </a:extLst>
+          </a:blip>
+          <a:stretch>
+            <a:fillRect/>
+          </a:stretch>
+        </p:blipFill>
+        <p:spPr>
+          <a:xfrm>
+            <a:off x="8748464" y="3212976"/>
+            <a:ext cx="864096" cy="864096"/>
+          </a:xfrm>
+          <a:prstGeom prst="rect">
+            <a:avLst/>
+          </a:prstGeom>
+        </p:spPr>
+      </p:pic>
     </p:spTree>
     <p:extLst>
       <p:ext uri="{BB962C8B-B14F-4D97-AF65-F5344CB8AC3E}">
-        <p14:creationId xmlns:p14="http://schemas.microsoft.com/office/powerpoint/2010/main" val="209836528"/>
+        <p14:creationId xmlns:p14="http://schemas.microsoft.com/office/powerpoint/2010/main" val="969595518"/>
       </p:ext>
     </p:extLst>
   </p:cSld>
@@ -3353,6 +3338,20 @@
 <file path=ppt/slides/slide4.xml><?xml version="1.0" encoding="utf-8"?>
 <p:sld xmlns:a="http://schemas.openxmlformats.org/drawingml/2006/main" xmlns:r="http://schemas.openxmlformats.org/officeDocument/2006/relationships" xmlns:p="http://schemas.openxmlformats.org/presentationml/2006/main">
   <p:cSld>
+    <p:bg>
+      <p:bgPr>
+        <a:blipFill dpi="0" rotWithShape="1">
+          <a:blip r:embed="rId2">
+            <a:lum/>
+          </a:blip>
+          <a:srcRect/>
+          <a:stretch>
+            <a:fillRect l="-7000" r="-5000"/>
+          </a:stretch>
+        </a:blipFill>
+        <a:effectLst/>
+      </p:bgPr>
+    </p:bg>
     <p:spTree>
       <p:nvGrpSpPr>
         <p:cNvPr id="1" name=""/>
@@ -3367,59 +3366,10 @@
           <a:chExt cx="0" cy="0"/>
         </a:xfrm>
       </p:grpSpPr>
-      <p:sp>
-        <p:nvSpPr>
-          <p:cNvPr id="2" name="1 Título"/>
-          <p:cNvSpPr>
-            <a:spLocks noGrp="1"/>
-          </p:cNvSpPr>
-          <p:nvPr>
-            <p:ph type="title"/>
-          </p:nvPr>
-        </p:nvSpPr>
-        <p:spPr/>
-        <p:txBody>
-          <a:bodyPr/>
-          <a:lstStyle/>
-          <a:p>
-            <a:r>
-              <a:rPr lang="es-ES" dirty="0" smtClean="0"/>
-              <a:t>Solución</a:t>
-            </a:r>
-            <a:endParaRPr lang="es-ES" dirty="0"/>
-          </a:p>
-        </p:txBody>
-      </p:sp>
-      <p:sp>
-        <p:nvSpPr>
-          <p:cNvPr id="3" name="2 Marcador de contenido"/>
-          <p:cNvSpPr>
-            <a:spLocks noGrp="1"/>
-          </p:cNvSpPr>
-          <p:nvPr>
-            <p:ph idx="1"/>
-          </p:nvPr>
-        </p:nvSpPr>
-        <p:spPr/>
-        <p:txBody>
-          <a:bodyPr/>
-          <a:lstStyle/>
-          <a:p>
-            <a:pPr marL="0" indent="0">
-              <a:buNone/>
-            </a:pPr>
-            <a:r>
-              <a:rPr lang="es-ES" dirty="0" smtClean="0"/>
-              <a:t>Por suerte, se ha ofrecido otro agente a saltar por las azoteas de la cuidad. Y esta vez no cometeremos el mismo error: vamos a continuar el desarrollo del juego.</a:t>
-            </a:r>
-            <a:endParaRPr lang="es-ES" dirty="0"/>
-          </a:p>
-        </p:txBody>
-      </p:sp>
     </p:spTree>
     <p:extLst>
       <p:ext uri="{BB962C8B-B14F-4D97-AF65-F5344CB8AC3E}">
-        <p14:creationId xmlns:p14="http://schemas.microsoft.com/office/powerpoint/2010/main" val="1355538716"/>
+        <p14:creationId xmlns:p14="http://schemas.microsoft.com/office/powerpoint/2010/main" val="184255913"/>
       </p:ext>
     </p:extLst>
   </p:cSld>
@@ -3432,6 +3382,20 @@
 <file path=ppt/slides/slide5.xml><?xml version="1.0" encoding="utf-8"?>
 <p:sld xmlns:a="http://schemas.openxmlformats.org/drawingml/2006/main" xmlns:r="http://schemas.openxmlformats.org/officeDocument/2006/relationships" xmlns:p="http://schemas.openxmlformats.org/presentationml/2006/main">
   <p:cSld>
+    <p:bg>
+      <p:bgPr>
+        <a:blipFill dpi="0" rotWithShape="1">
+          <a:blip r:embed="rId2">
+            <a:lum/>
+          </a:blip>
+          <a:srcRect/>
+          <a:stretch>
+            <a:fillRect l="-16000" r="-12000"/>
+          </a:stretch>
+        </a:blipFill>
+        <a:effectLst/>
+      </p:bgPr>
+    </p:bg>
     <p:spTree>
       <p:nvGrpSpPr>
         <p:cNvPr id="1" name=""/>
@@ -3446,59 +3410,10 @@
           <a:chExt cx="0" cy="0"/>
         </a:xfrm>
       </p:grpSpPr>
-      <p:sp>
-        <p:nvSpPr>
-          <p:cNvPr id="2" name="1 Título"/>
-          <p:cNvSpPr>
-            <a:spLocks noGrp="1"/>
-          </p:cNvSpPr>
-          <p:nvPr>
-            <p:ph type="title"/>
-          </p:nvPr>
-        </p:nvSpPr>
-        <p:spPr/>
-        <p:txBody>
-          <a:bodyPr/>
-          <a:lstStyle/>
-          <a:p>
-            <a:r>
-              <a:rPr lang="es-ES" dirty="0" smtClean="0"/>
-              <a:t>Al grano</a:t>
-            </a:r>
-            <a:endParaRPr lang="es-ES" dirty="0"/>
-          </a:p>
-        </p:txBody>
-      </p:sp>
-      <p:sp>
-        <p:nvSpPr>
-          <p:cNvPr id="6" name="5 Marcador de contenido"/>
-          <p:cNvSpPr>
-            <a:spLocks noGrp="1"/>
-          </p:cNvSpPr>
-          <p:nvPr>
-            <p:ph idx="1"/>
-          </p:nvPr>
-        </p:nvSpPr>
-        <p:spPr/>
-        <p:txBody>
-          <a:bodyPr/>
-          <a:lstStyle/>
-          <a:p>
-            <a:pPr marL="0" indent="0">
-              <a:buNone/>
-            </a:pPr>
-            <a:r>
-              <a:rPr lang="es-ES" dirty="0" smtClean="0"/>
-              <a:t>Durante este tiempo hemos hecho coleccionables, enemigos, obstáculos y un primer nivel de prueba.</a:t>
-            </a:r>
-            <a:endParaRPr lang="es-ES" dirty="0"/>
-          </a:p>
-        </p:txBody>
-      </p:sp>
     </p:spTree>
     <p:extLst>
       <p:ext uri="{BB962C8B-B14F-4D97-AF65-F5344CB8AC3E}">
-        <p14:creationId xmlns:p14="http://schemas.microsoft.com/office/powerpoint/2010/main" val="969595518"/>
+        <p14:creationId xmlns:p14="http://schemas.microsoft.com/office/powerpoint/2010/main" val="1209496055"/>
       </p:ext>
     </p:extLst>
   </p:cSld>
@@ -3511,6 +3426,20 @@
 <file path=ppt/slides/slide6.xml><?xml version="1.0" encoding="utf-8"?>
 <p:sld xmlns:a="http://schemas.openxmlformats.org/drawingml/2006/main" xmlns:r="http://schemas.openxmlformats.org/officeDocument/2006/relationships" xmlns:p="http://schemas.openxmlformats.org/presentationml/2006/main">
   <p:cSld>
+    <p:bg>
+      <p:bgPr>
+        <a:blipFill dpi="0" rotWithShape="1">
+          <a:blip r:embed="rId2">
+            <a:lum/>
+          </a:blip>
+          <a:srcRect/>
+          <a:stretch>
+            <a:fillRect/>
+          </a:stretch>
+        </a:blipFill>
+        <a:effectLst/>
+      </p:bgPr>
+    </p:bg>
     <p:spTree>
       <p:nvGrpSpPr>
         <p:cNvPr id="1" name=""/>
@@ -3525,289 +3454,6 @@
           <a:chExt cx="0" cy="0"/>
         </a:xfrm>
       </p:grpSpPr>
-      <p:sp>
-        <p:nvSpPr>
-          <p:cNvPr id="2" name="1 Título"/>
-          <p:cNvSpPr>
-            <a:spLocks noGrp="1"/>
-          </p:cNvSpPr>
-          <p:nvPr>
-            <p:ph type="title"/>
-          </p:nvPr>
-        </p:nvSpPr>
-        <p:spPr/>
-        <p:txBody>
-          <a:bodyPr/>
-          <a:lstStyle/>
-          <a:p>
-            <a:r>
-              <a:rPr lang="es-ES" dirty="0" smtClean="0"/>
-              <a:t>Al grano 2</a:t>
-            </a:r>
-            <a:endParaRPr lang="es-ES" dirty="0"/>
-          </a:p>
-        </p:txBody>
-      </p:sp>
-      <p:sp>
-        <p:nvSpPr>
-          <p:cNvPr id="3" name="2 Marcador de contenido"/>
-          <p:cNvSpPr>
-            <a:spLocks noGrp="1"/>
-          </p:cNvSpPr>
-          <p:nvPr>
-            <p:ph idx="1"/>
-          </p:nvPr>
-        </p:nvSpPr>
-        <p:spPr/>
-        <p:txBody>
-          <a:bodyPr/>
-          <a:lstStyle/>
-          <a:p>
-            <a:pPr marL="0" indent="0">
-              <a:buNone/>
-            </a:pPr>
-            <a:r>
-              <a:rPr lang="es-ES" dirty="0" smtClean="0"/>
-              <a:t>FOTO DEL NIVEL, explicar un poco por encima.</a:t>
-            </a:r>
-            <a:endParaRPr lang="es-ES" dirty="0"/>
-          </a:p>
-        </p:txBody>
-      </p:sp>
-    </p:spTree>
-    <p:extLst>
-      <p:ext uri="{BB962C8B-B14F-4D97-AF65-F5344CB8AC3E}">
-        <p14:creationId xmlns:p14="http://schemas.microsoft.com/office/powerpoint/2010/main" val="2187112650"/>
-      </p:ext>
-    </p:extLst>
-  </p:cSld>
-  <p:clrMapOvr>
-    <a:masterClrMapping/>
-  </p:clrMapOvr>
-</p:sld>
-</file>
-
-<file path=ppt/slides/slide7.xml><?xml version="1.0" encoding="utf-8"?>
-<p:sld xmlns:a="http://schemas.openxmlformats.org/drawingml/2006/main" xmlns:r="http://schemas.openxmlformats.org/officeDocument/2006/relationships" xmlns:p="http://schemas.openxmlformats.org/presentationml/2006/main">
-  <p:cSld>
-    <p:spTree>
-      <p:nvGrpSpPr>
-        <p:cNvPr id="1" name=""/>
-        <p:cNvGrpSpPr/>
-        <p:nvPr/>
-      </p:nvGrpSpPr>
-      <p:grpSpPr>
-        <a:xfrm>
-          <a:off x="0" y="0"/>
-          <a:ext cx="0" cy="0"/>
-          <a:chOff x="0" y="0"/>
-          <a:chExt cx="0" cy="0"/>
-        </a:xfrm>
-      </p:grpSpPr>
-      <p:sp>
-        <p:nvSpPr>
-          <p:cNvPr id="2" name="1 Título"/>
-          <p:cNvSpPr>
-            <a:spLocks noGrp="1"/>
-          </p:cNvSpPr>
-          <p:nvPr>
-            <p:ph type="title"/>
-          </p:nvPr>
-        </p:nvSpPr>
-        <p:spPr/>
-        <p:txBody>
-          <a:bodyPr/>
-          <a:lstStyle/>
-          <a:p>
-            <a:r>
-              <a:rPr lang="es-ES" dirty="0" smtClean="0"/>
-              <a:t>Desarrollo</a:t>
-            </a:r>
-            <a:endParaRPr lang="es-ES" dirty="0"/>
-          </a:p>
-        </p:txBody>
-      </p:sp>
-      <p:sp>
-        <p:nvSpPr>
-          <p:cNvPr id="3" name="2 Marcador de contenido"/>
-          <p:cNvSpPr>
-            <a:spLocks noGrp="1"/>
-          </p:cNvSpPr>
-          <p:nvPr>
-            <p:ph idx="1"/>
-          </p:nvPr>
-        </p:nvSpPr>
-        <p:spPr/>
-        <p:txBody>
-          <a:bodyPr/>
-          <a:lstStyle/>
-          <a:p>
-            <a:pPr marL="0" indent="0">
-              <a:buNone/>
-            </a:pPr>
-            <a:r>
-              <a:rPr lang="es-ES" dirty="0" smtClean="0"/>
-              <a:t>Durante el desarrollo hemos tenido problemas con la API, hemos pensado en descartar algunas cosas temporalmente.</a:t>
-            </a:r>
-            <a:endParaRPr lang="es-ES" dirty="0"/>
-          </a:p>
-        </p:txBody>
-      </p:sp>
-    </p:spTree>
-    <p:extLst>
-      <p:ext uri="{BB962C8B-B14F-4D97-AF65-F5344CB8AC3E}">
-        <p14:creationId xmlns:p14="http://schemas.microsoft.com/office/powerpoint/2010/main" val="184255913"/>
-      </p:ext>
-    </p:extLst>
-  </p:cSld>
-  <p:clrMapOvr>
-    <a:masterClrMapping/>
-  </p:clrMapOvr>
-</p:sld>
-</file>
-
-<file path=ppt/slides/slide8.xml><?xml version="1.0" encoding="utf-8"?>
-<p:sld xmlns:a="http://schemas.openxmlformats.org/drawingml/2006/main" xmlns:r="http://schemas.openxmlformats.org/officeDocument/2006/relationships" xmlns:p="http://schemas.openxmlformats.org/presentationml/2006/main">
-  <p:cSld>
-    <p:spTree>
-      <p:nvGrpSpPr>
-        <p:cNvPr id="1" name=""/>
-        <p:cNvGrpSpPr/>
-        <p:nvPr/>
-      </p:nvGrpSpPr>
-      <p:grpSpPr>
-        <a:xfrm>
-          <a:off x="0" y="0"/>
-          <a:ext cx="0" cy="0"/>
-          <a:chOff x="0" y="0"/>
-          <a:chExt cx="0" cy="0"/>
-        </a:xfrm>
-      </p:grpSpPr>
-      <p:sp>
-        <p:nvSpPr>
-          <p:cNvPr id="2" name="1 Título"/>
-          <p:cNvSpPr>
-            <a:spLocks noGrp="1"/>
-          </p:cNvSpPr>
-          <p:nvPr>
-            <p:ph type="title"/>
-          </p:nvPr>
-        </p:nvSpPr>
-        <p:spPr/>
-        <p:txBody>
-          <a:bodyPr/>
-          <a:lstStyle/>
-          <a:p>
-            <a:r>
-              <a:rPr lang="es-ES" dirty="0" err="1" smtClean="0"/>
-              <a:t>Palante</a:t>
-            </a:r>
-            <a:endParaRPr lang="es-ES" dirty="0"/>
-          </a:p>
-        </p:txBody>
-      </p:sp>
-      <p:sp>
-        <p:nvSpPr>
-          <p:cNvPr id="3" name="2 Marcador de contenido"/>
-          <p:cNvSpPr>
-            <a:spLocks noGrp="1"/>
-          </p:cNvSpPr>
-          <p:nvPr>
-            <p:ph idx="1"/>
-          </p:nvPr>
-        </p:nvSpPr>
-        <p:spPr/>
-        <p:txBody>
-          <a:bodyPr/>
-          <a:lstStyle/>
-          <a:p>
-            <a:pPr marL="0" indent="0">
-              <a:buNone/>
-            </a:pPr>
-            <a:r>
-              <a:rPr lang="es-ES" dirty="0" smtClean="0"/>
-              <a:t>Tenemos pensado hacer más niveles, crear un top de puntuaciones y pulir el juego para que nuestro voluntario pueda entrenar y acabar con el CONSTRUCT-0R de una vez por todas.</a:t>
-            </a:r>
-            <a:endParaRPr lang="es-ES" dirty="0"/>
-          </a:p>
-        </p:txBody>
-      </p:sp>
-    </p:spTree>
-    <p:extLst>
-      <p:ext uri="{BB962C8B-B14F-4D97-AF65-F5344CB8AC3E}">
-        <p14:creationId xmlns:p14="http://schemas.microsoft.com/office/powerpoint/2010/main" val="1209496055"/>
-      </p:ext>
-    </p:extLst>
-  </p:cSld>
-  <p:clrMapOvr>
-    <a:masterClrMapping/>
-  </p:clrMapOvr>
-</p:sld>
-</file>
-
-<file path=ppt/slides/slide9.xml><?xml version="1.0" encoding="utf-8"?>
-<p:sld xmlns:a="http://schemas.openxmlformats.org/drawingml/2006/main" xmlns:r="http://schemas.openxmlformats.org/officeDocument/2006/relationships" xmlns:p="http://schemas.openxmlformats.org/presentationml/2006/main">
-  <p:cSld>
-    <p:spTree>
-      <p:nvGrpSpPr>
-        <p:cNvPr id="1" name=""/>
-        <p:cNvGrpSpPr/>
-        <p:nvPr/>
-      </p:nvGrpSpPr>
-      <p:grpSpPr>
-        <a:xfrm>
-          <a:off x="0" y="0"/>
-          <a:ext cx="0" cy="0"/>
-          <a:chOff x="0" y="0"/>
-          <a:chExt cx="0" cy="0"/>
-        </a:xfrm>
-      </p:grpSpPr>
-      <p:sp>
-        <p:nvSpPr>
-          <p:cNvPr id="2" name="1 Título"/>
-          <p:cNvSpPr>
-            <a:spLocks noGrp="1"/>
-          </p:cNvSpPr>
-          <p:nvPr>
-            <p:ph type="ctrTitle"/>
-          </p:nvPr>
-        </p:nvSpPr>
-        <p:spPr/>
-        <p:txBody>
-          <a:bodyPr/>
-          <a:lstStyle/>
-          <a:p>
-            <a:r>
-              <a:rPr lang="es-ES" dirty="0" smtClean="0"/>
-              <a:t>Fin</a:t>
-            </a:r>
-            <a:endParaRPr lang="es-ES" dirty="0"/>
-          </a:p>
-        </p:txBody>
-      </p:sp>
-      <p:sp>
-        <p:nvSpPr>
-          <p:cNvPr id="3" name="2 Subtítulo"/>
-          <p:cNvSpPr>
-            <a:spLocks noGrp="1"/>
-          </p:cNvSpPr>
-          <p:nvPr>
-            <p:ph type="subTitle" idx="1"/>
-          </p:nvPr>
-        </p:nvSpPr>
-        <p:spPr/>
-        <p:txBody>
-          <a:bodyPr/>
-          <a:lstStyle/>
-          <a:p>
-            <a:r>
-              <a:rPr lang="es-ES" dirty="0" err="1" smtClean="0"/>
-              <a:t>Sacabó</a:t>
-            </a:r>
-            <a:endParaRPr lang="es-ES" dirty="0"/>
-          </a:p>
-        </p:txBody>
-      </p:sp>
     </p:spTree>
     <p:extLst>
       <p:ext uri="{BB962C8B-B14F-4D97-AF65-F5344CB8AC3E}">

</xml_diff>